<commit_message>
added content to the README.md file
</commit_message>
<xml_diff>
--- a/Channel_crosstalk.pptx
+++ b/Channel_crosstalk.pptx
@@ -4,6 +4,9 @@
   <p:sldMasterIdLst>
     <p:sldMasterId id="2147483648" r:id="rId1"/>
   </p:sldMasterIdLst>
+  <p:notesMasterIdLst>
+    <p:notesMasterId r:id="rId9"/>
+  </p:notesMasterIdLst>
   <p:sldIdLst>
     <p:sldId id="256" r:id="rId2"/>
     <p:sldId id="257" r:id="rId3"/>
@@ -118,6 +121,1029 @@
 </p:presentation>
 </file>
 
+<file path=ppt/notesMasters/notesMaster1.xml><?xml version="1.0" encoding="utf-8"?>
+<p:notesMaster xmlns:a="http://schemas.openxmlformats.org/drawingml/2006/main" xmlns:r="http://schemas.openxmlformats.org/officeDocument/2006/relationships" xmlns:p="http://schemas.openxmlformats.org/presentationml/2006/main">
+  <p:cSld>
+    <p:bg>
+      <p:bgRef idx="1001">
+        <a:schemeClr val="bg1"/>
+      </p:bgRef>
+    </p:bg>
+    <p:spTree>
+      <p:nvGrpSpPr>
+        <p:cNvPr id="1" name=""/>
+        <p:cNvGrpSpPr/>
+        <p:nvPr/>
+      </p:nvGrpSpPr>
+      <p:grpSpPr>
+        <a:xfrm>
+          <a:off x="0" y="0"/>
+          <a:ext cx="0" cy="0"/>
+          <a:chOff x="0" y="0"/>
+          <a:chExt cx="0" cy="0"/>
+        </a:xfrm>
+      </p:grpSpPr>
+      <p:sp>
+        <p:nvSpPr>
+          <p:cNvPr id="2" name="Header Placeholder 1"/>
+          <p:cNvSpPr>
+            <a:spLocks noGrp="1"/>
+          </p:cNvSpPr>
+          <p:nvPr>
+            <p:ph type="hdr" sz="quarter"/>
+          </p:nvPr>
+        </p:nvSpPr>
+        <p:spPr>
+          <a:xfrm>
+            <a:off x="0" y="0"/>
+            <a:ext cx="2971800" cy="458788"/>
+          </a:xfrm>
+          <a:prstGeom prst="rect">
+            <a:avLst/>
+          </a:prstGeom>
+        </p:spPr>
+        <p:txBody>
+          <a:bodyPr vert="horz" lIns="91440" tIns="45720" rIns="91440" bIns="45720" rtlCol="0"/>
+          <a:lstStyle>
+            <a:lvl1pPr algn="l">
+              <a:defRPr sz="1200"/>
+            </a:lvl1pPr>
+          </a:lstStyle>
+          <a:p>
+            <a:endParaRPr lang="en-US"/>
+          </a:p>
+        </p:txBody>
+      </p:sp>
+      <p:sp>
+        <p:nvSpPr>
+          <p:cNvPr id="3" name="Date Placeholder 2"/>
+          <p:cNvSpPr>
+            <a:spLocks noGrp="1"/>
+          </p:cNvSpPr>
+          <p:nvPr>
+            <p:ph type="dt" idx="1"/>
+          </p:nvPr>
+        </p:nvSpPr>
+        <p:spPr>
+          <a:xfrm>
+            <a:off x="3884613" y="0"/>
+            <a:ext cx="2971800" cy="458788"/>
+          </a:xfrm>
+          <a:prstGeom prst="rect">
+            <a:avLst/>
+          </a:prstGeom>
+        </p:spPr>
+        <p:txBody>
+          <a:bodyPr vert="horz" lIns="91440" tIns="45720" rIns="91440" bIns="45720" rtlCol="0"/>
+          <a:lstStyle>
+            <a:lvl1pPr algn="r">
+              <a:defRPr sz="1200"/>
+            </a:lvl1pPr>
+          </a:lstStyle>
+          <a:p>
+            <a:fld id="{BF0E4E8C-BD2F-EA45-8AE0-93B2773BE138}" type="datetimeFigureOut">
+              <a:rPr lang="en-US" smtClean="0"/>
+              <a:t>12/1/22</a:t>
+            </a:fld>
+            <a:endParaRPr lang="en-US"/>
+          </a:p>
+        </p:txBody>
+      </p:sp>
+      <p:sp>
+        <p:nvSpPr>
+          <p:cNvPr id="4" name="Slide Image Placeholder 3"/>
+          <p:cNvSpPr>
+            <a:spLocks noGrp="1" noRot="1" noChangeAspect="1"/>
+          </p:cNvSpPr>
+          <p:nvPr>
+            <p:ph type="sldImg" idx="2"/>
+          </p:nvPr>
+        </p:nvSpPr>
+        <p:spPr>
+          <a:xfrm>
+            <a:off x="685800" y="1143000"/>
+            <a:ext cx="5486400" cy="3086100"/>
+          </a:xfrm>
+          <a:prstGeom prst="rect">
+            <a:avLst/>
+          </a:prstGeom>
+          <a:noFill/>
+          <a:ln w="12700">
+            <a:solidFill>
+              <a:prstClr val="black"/>
+            </a:solidFill>
+          </a:ln>
+        </p:spPr>
+        <p:txBody>
+          <a:bodyPr vert="horz" lIns="91440" tIns="45720" rIns="91440" bIns="45720" rtlCol="0" anchor="ctr"/>
+          <a:lstStyle/>
+          <a:p>
+            <a:endParaRPr lang="en-US"/>
+          </a:p>
+        </p:txBody>
+      </p:sp>
+      <p:sp>
+        <p:nvSpPr>
+          <p:cNvPr id="5" name="Notes Placeholder 4"/>
+          <p:cNvSpPr>
+            <a:spLocks noGrp="1"/>
+          </p:cNvSpPr>
+          <p:nvPr>
+            <p:ph type="body" sz="quarter" idx="3"/>
+          </p:nvPr>
+        </p:nvSpPr>
+        <p:spPr>
+          <a:xfrm>
+            <a:off x="685800" y="4400550"/>
+            <a:ext cx="5486400" cy="3600450"/>
+          </a:xfrm>
+          <a:prstGeom prst="rect">
+            <a:avLst/>
+          </a:prstGeom>
+        </p:spPr>
+        <p:txBody>
+          <a:bodyPr vert="horz" lIns="91440" tIns="45720" rIns="91440" bIns="45720" rtlCol="0"/>
+          <a:lstStyle/>
+          <a:p>
+            <a:pPr lvl="0"/>
+            <a:r>
+              <a:rPr lang="en-US"/>
+              <a:t>Click to edit Master text styles</a:t>
+            </a:r>
+          </a:p>
+          <a:p>
+            <a:pPr lvl="1"/>
+            <a:r>
+              <a:rPr lang="en-US"/>
+              <a:t>Second level</a:t>
+            </a:r>
+          </a:p>
+          <a:p>
+            <a:pPr lvl="2"/>
+            <a:r>
+              <a:rPr lang="en-US"/>
+              <a:t>Third level</a:t>
+            </a:r>
+          </a:p>
+          <a:p>
+            <a:pPr lvl="3"/>
+            <a:r>
+              <a:rPr lang="en-US"/>
+              <a:t>Fourth level</a:t>
+            </a:r>
+          </a:p>
+          <a:p>
+            <a:pPr lvl="4"/>
+            <a:r>
+              <a:rPr lang="en-US"/>
+              <a:t>Fifth level</a:t>
+            </a:r>
+          </a:p>
+        </p:txBody>
+      </p:sp>
+      <p:sp>
+        <p:nvSpPr>
+          <p:cNvPr id="6" name="Footer Placeholder 5"/>
+          <p:cNvSpPr>
+            <a:spLocks noGrp="1"/>
+          </p:cNvSpPr>
+          <p:nvPr>
+            <p:ph type="ftr" sz="quarter" idx="4"/>
+          </p:nvPr>
+        </p:nvSpPr>
+        <p:spPr>
+          <a:xfrm>
+            <a:off x="0" y="8685213"/>
+            <a:ext cx="2971800" cy="458787"/>
+          </a:xfrm>
+          <a:prstGeom prst="rect">
+            <a:avLst/>
+          </a:prstGeom>
+        </p:spPr>
+        <p:txBody>
+          <a:bodyPr vert="horz" lIns="91440" tIns="45720" rIns="91440" bIns="45720" rtlCol="0" anchor="b"/>
+          <a:lstStyle>
+            <a:lvl1pPr algn="l">
+              <a:defRPr sz="1200"/>
+            </a:lvl1pPr>
+          </a:lstStyle>
+          <a:p>
+            <a:endParaRPr lang="en-US"/>
+          </a:p>
+        </p:txBody>
+      </p:sp>
+      <p:sp>
+        <p:nvSpPr>
+          <p:cNvPr id="7" name="Slide Number Placeholder 6"/>
+          <p:cNvSpPr>
+            <a:spLocks noGrp="1"/>
+          </p:cNvSpPr>
+          <p:nvPr>
+            <p:ph type="sldNum" sz="quarter" idx="5"/>
+          </p:nvPr>
+        </p:nvSpPr>
+        <p:spPr>
+          <a:xfrm>
+            <a:off x="3884613" y="8685213"/>
+            <a:ext cx="2971800" cy="458787"/>
+          </a:xfrm>
+          <a:prstGeom prst="rect">
+            <a:avLst/>
+          </a:prstGeom>
+        </p:spPr>
+        <p:txBody>
+          <a:bodyPr vert="horz" lIns="91440" tIns="45720" rIns="91440" bIns="45720" rtlCol="0" anchor="b"/>
+          <a:lstStyle>
+            <a:lvl1pPr algn="r">
+              <a:defRPr sz="1200"/>
+            </a:lvl1pPr>
+          </a:lstStyle>
+          <a:p>
+            <a:fld id="{7163770A-BA93-F747-A6F5-6B9E28E65E39}" type="slidenum">
+              <a:rPr lang="en-US" smtClean="0"/>
+              <a:t>‹#›</a:t>
+            </a:fld>
+            <a:endParaRPr lang="en-US"/>
+          </a:p>
+        </p:txBody>
+      </p:sp>
+    </p:spTree>
+    <p:extLst>
+      <p:ext uri="{BB962C8B-B14F-4D97-AF65-F5344CB8AC3E}">
+        <p14:creationId xmlns:p14="http://schemas.microsoft.com/office/powerpoint/2010/main" val="3322585947"/>
+      </p:ext>
+    </p:extLst>
+  </p:cSld>
+  <p:clrMap bg1="lt1" tx1="dk1" bg2="lt2" tx2="dk2" accent1="accent1" accent2="accent2" accent3="accent3" accent4="accent4" accent5="accent5" accent6="accent6" hlink="hlink" folHlink="folHlink"/>
+  <p:notesStyle>
+    <a:lvl1pPr marL="0" algn="l" defTabSz="914400" rtl="0" eaLnBrk="1" latinLnBrk="0" hangingPunct="1">
+      <a:defRPr sz="1200" kern="1200">
+        <a:solidFill>
+          <a:schemeClr val="tx1"/>
+        </a:solidFill>
+        <a:latin typeface="+mn-lt"/>
+        <a:ea typeface="+mn-ea"/>
+        <a:cs typeface="+mn-cs"/>
+      </a:defRPr>
+    </a:lvl1pPr>
+    <a:lvl2pPr marL="457200" algn="l" defTabSz="914400" rtl="0" eaLnBrk="1" latinLnBrk="0" hangingPunct="1">
+      <a:defRPr sz="1200" kern="1200">
+        <a:solidFill>
+          <a:schemeClr val="tx1"/>
+        </a:solidFill>
+        <a:latin typeface="+mn-lt"/>
+        <a:ea typeface="+mn-ea"/>
+        <a:cs typeface="+mn-cs"/>
+      </a:defRPr>
+    </a:lvl2pPr>
+    <a:lvl3pPr marL="914400" algn="l" defTabSz="914400" rtl="0" eaLnBrk="1" latinLnBrk="0" hangingPunct="1">
+      <a:defRPr sz="1200" kern="1200">
+        <a:solidFill>
+          <a:schemeClr val="tx1"/>
+        </a:solidFill>
+        <a:latin typeface="+mn-lt"/>
+        <a:ea typeface="+mn-ea"/>
+        <a:cs typeface="+mn-cs"/>
+      </a:defRPr>
+    </a:lvl3pPr>
+    <a:lvl4pPr marL="1371600" algn="l" defTabSz="914400" rtl="0" eaLnBrk="1" latinLnBrk="0" hangingPunct="1">
+      <a:defRPr sz="1200" kern="1200">
+        <a:solidFill>
+          <a:schemeClr val="tx1"/>
+        </a:solidFill>
+        <a:latin typeface="+mn-lt"/>
+        <a:ea typeface="+mn-ea"/>
+        <a:cs typeface="+mn-cs"/>
+      </a:defRPr>
+    </a:lvl4pPr>
+    <a:lvl5pPr marL="1828800" algn="l" defTabSz="914400" rtl="0" eaLnBrk="1" latinLnBrk="0" hangingPunct="1">
+      <a:defRPr sz="1200" kern="1200">
+        <a:solidFill>
+          <a:schemeClr val="tx1"/>
+        </a:solidFill>
+        <a:latin typeface="+mn-lt"/>
+        <a:ea typeface="+mn-ea"/>
+        <a:cs typeface="+mn-cs"/>
+      </a:defRPr>
+    </a:lvl5pPr>
+    <a:lvl6pPr marL="2286000" algn="l" defTabSz="914400" rtl="0" eaLnBrk="1" latinLnBrk="0" hangingPunct="1">
+      <a:defRPr sz="1200" kern="1200">
+        <a:solidFill>
+          <a:schemeClr val="tx1"/>
+        </a:solidFill>
+        <a:latin typeface="+mn-lt"/>
+        <a:ea typeface="+mn-ea"/>
+        <a:cs typeface="+mn-cs"/>
+      </a:defRPr>
+    </a:lvl6pPr>
+    <a:lvl7pPr marL="2743200" algn="l" defTabSz="914400" rtl="0" eaLnBrk="1" latinLnBrk="0" hangingPunct="1">
+      <a:defRPr sz="1200" kern="1200">
+        <a:solidFill>
+          <a:schemeClr val="tx1"/>
+        </a:solidFill>
+        <a:latin typeface="+mn-lt"/>
+        <a:ea typeface="+mn-ea"/>
+        <a:cs typeface="+mn-cs"/>
+      </a:defRPr>
+    </a:lvl7pPr>
+    <a:lvl8pPr marL="3200400" algn="l" defTabSz="914400" rtl="0" eaLnBrk="1" latinLnBrk="0" hangingPunct="1">
+      <a:defRPr sz="1200" kern="1200">
+        <a:solidFill>
+          <a:schemeClr val="tx1"/>
+        </a:solidFill>
+        <a:latin typeface="+mn-lt"/>
+        <a:ea typeface="+mn-ea"/>
+        <a:cs typeface="+mn-cs"/>
+      </a:defRPr>
+    </a:lvl8pPr>
+    <a:lvl9pPr marL="3657600" algn="l" defTabSz="914400" rtl="0" eaLnBrk="1" latinLnBrk="0" hangingPunct="1">
+      <a:defRPr sz="1200" kern="1200">
+        <a:solidFill>
+          <a:schemeClr val="tx1"/>
+        </a:solidFill>
+        <a:latin typeface="+mn-lt"/>
+        <a:ea typeface="+mn-ea"/>
+        <a:cs typeface="+mn-cs"/>
+      </a:defRPr>
+    </a:lvl9pPr>
+  </p:notesStyle>
+</p:notesMaster>
+</file>
+
+<file path=ppt/notesSlides/notesSlide1.xml><?xml version="1.0" encoding="utf-8"?>
+<p:notes xmlns:a="http://schemas.openxmlformats.org/drawingml/2006/main" xmlns:r="http://schemas.openxmlformats.org/officeDocument/2006/relationships" xmlns:p="http://schemas.openxmlformats.org/presentationml/2006/main">
+  <p:cSld>
+    <p:spTree>
+      <p:nvGrpSpPr>
+        <p:cNvPr id="1" name=""/>
+        <p:cNvGrpSpPr/>
+        <p:nvPr/>
+      </p:nvGrpSpPr>
+      <p:grpSpPr>
+        <a:xfrm>
+          <a:off x="0" y="0"/>
+          <a:ext cx="0" cy="0"/>
+          <a:chOff x="0" y="0"/>
+          <a:chExt cx="0" cy="0"/>
+        </a:xfrm>
+      </p:grpSpPr>
+      <p:sp>
+        <p:nvSpPr>
+          <p:cNvPr id="2" name="Slide Image Placeholder 1"/>
+          <p:cNvSpPr>
+            <a:spLocks noGrp="1" noRot="1" noChangeAspect="1"/>
+          </p:cNvSpPr>
+          <p:nvPr>
+            <p:ph type="sldImg"/>
+          </p:nvPr>
+        </p:nvSpPr>
+        <p:spPr/>
+      </p:sp>
+      <p:sp>
+        <p:nvSpPr>
+          <p:cNvPr id="3" name="Notes Placeholder 2"/>
+          <p:cNvSpPr>
+            <a:spLocks noGrp="1"/>
+          </p:cNvSpPr>
+          <p:nvPr>
+            <p:ph type="body" idx="1"/>
+          </p:nvPr>
+        </p:nvSpPr>
+        <p:spPr/>
+        <p:txBody>
+          <a:bodyPr/>
+          <a:lstStyle/>
+          <a:p>
+            <a:r>
+              <a:rPr lang="en-US" dirty="0"/>
+              <a:t>A back-of-the-envelope calculation of TMT channel crosstalk for 18-plex reagents.</a:t>
+            </a:r>
+          </a:p>
+        </p:txBody>
+      </p:sp>
+      <p:sp>
+        <p:nvSpPr>
+          <p:cNvPr id="4" name="Slide Number Placeholder 3"/>
+          <p:cNvSpPr>
+            <a:spLocks noGrp="1"/>
+          </p:cNvSpPr>
+          <p:nvPr>
+            <p:ph type="sldNum" sz="quarter" idx="5"/>
+          </p:nvPr>
+        </p:nvSpPr>
+        <p:spPr/>
+        <p:txBody>
+          <a:bodyPr/>
+          <a:lstStyle/>
+          <a:p>
+            <a:fld id="{7163770A-BA93-F747-A6F5-6B9E28E65E39}" type="slidenum">
+              <a:rPr lang="en-US" smtClean="0"/>
+              <a:t>1</a:t>
+            </a:fld>
+            <a:endParaRPr lang="en-US"/>
+          </a:p>
+        </p:txBody>
+      </p:sp>
+    </p:spTree>
+    <p:extLst>
+      <p:ext uri="{BB962C8B-B14F-4D97-AF65-F5344CB8AC3E}">
+        <p14:creationId xmlns:p14="http://schemas.microsoft.com/office/powerpoint/2010/main" val="1815805819"/>
+      </p:ext>
+    </p:extLst>
+  </p:cSld>
+  <p:clrMapOvr>
+    <a:masterClrMapping/>
+  </p:clrMapOvr>
+</p:notes>
+</file>
+
+<file path=ppt/notesSlides/notesSlide2.xml><?xml version="1.0" encoding="utf-8"?>
+<p:notes xmlns:a="http://schemas.openxmlformats.org/drawingml/2006/main" xmlns:r="http://schemas.openxmlformats.org/officeDocument/2006/relationships" xmlns:p="http://schemas.openxmlformats.org/presentationml/2006/main">
+  <p:cSld>
+    <p:spTree>
+      <p:nvGrpSpPr>
+        <p:cNvPr id="1" name=""/>
+        <p:cNvGrpSpPr/>
+        <p:nvPr/>
+      </p:nvGrpSpPr>
+      <p:grpSpPr>
+        <a:xfrm>
+          <a:off x="0" y="0"/>
+          <a:ext cx="0" cy="0"/>
+          <a:chOff x="0" y="0"/>
+          <a:chExt cx="0" cy="0"/>
+        </a:xfrm>
+      </p:grpSpPr>
+      <p:sp>
+        <p:nvSpPr>
+          <p:cNvPr id="2" name="Slide Image Placeholder 1"/>
+          <p:cNvSpPr>
+            <a:spLocks noGrp="1" noRot="1" noChangeAspect="1"/>
+          </p:cNvSpPr>
+          <p:nvPr>
+            <p:ph type="sldImg"/>
+          </p:nvPr>
+        </p:nvSpPr>
+        <p:spPr/>
+      </p:sp>
+      <p:sp>
+        <p:nvSpPr>
+          <p:cNvPr id="3" name="Notes Placeholder 2"/>
+          <p:cNvSpPr>
+            <a:spLocks noGrp="1"/>
+          </p:cNvSpPr>
+          <p:nvPr>
+            <p:ph type="body" idx="1"/>
+          </p:nvPr>
+        </p:nvSpPr>
+        <p:spPr/>
+        <p:txBody>
+          <a:bodyPr/>
+          <a:lstStyle/>
+          <a:p>
+            <a:r>
+              <a:rPr lang="en-US" dirty="0"/>
+              <a:t>Carbon-13 has a natural abundance of about 1% in nature. TMT tags have 8 carbon atoms. The 126C tag, with all carbons being natural carbon (a mix is 99% C-12 and 1% C-13) would have about 8% of its total intensity in the 127C tag peak and 92% of the intensity in the 126C peak. Each nominal one mass unit heavier tag has a naturally occurring atom replaced by an isotopically enriched heavier isotope. We have progressively fewer natural atoms and the percentage of the intensity that falls into the next heavier tag (in its respective series - N or C) decreases as we go from light tags to heavier tags, as shown in the top row for the C-series tags.</a:t>
+            </a:r>
+          </a:p>
+          <a:p>
+            <a:endParaRPr lang="en-US" dirty="0"/>
+          </a:p>
+          <a:p>
+            <a:r>
+              <a:rPr lang="en-US" dirty="0"/>
+              <a:t>We will assuming we have high resolution in the reporter ion region and can resolve the N- and C-series peaks. There is a similar natural C-13 effect in the carbon atoms in the N-series tags but it is shifted, as shown in the bottom row. The 127N tag has 8 natural carbon atoms.</a:t>
+            </a:r>
+          </a:p>
+          <a:p>
+            <a:endParaRPr lang="en-US" dirty="0"/>
+          </a:p>
+          <a:p>
+            <a:r>
+              <a:rPr lang="en-US" dirty="0"/>
+              <a:t>Note: these numbers are approximate. No attempt was made to model the isotopic distributions of each tag. We would have to assume a purity for the C-13 and N-15 atoms to do that. If you look at the spec sheets for the isotopic distributions of the tags that are measured for TMT reagent batches, you will see that these numbers are pretty close.</a:t>
+            </a:r>
+          </a:p>
+        </p:txBody>
+      </p:sp>
+      <p:sp>
+        <p:nvSpPr>
+          <p:cNvPr id="4" name="Slide Number Placeholder 3"/>
+          <p:cNvSpPr>
+            <a:spLocks noGrp="1"/>
+          </p:cNvSpPr>
+          <p:nvPr>
+            <p:ph type="sldNum" sz="quarter" idx="5"/>
+          </p:nvPr>
+        </p:nvSpPr>
+        <p:spPr/>
+        <p:txBody>
+          <a:bodyPr/>
+          <a:lstStyle/>
+          <a:p>
+            <a:fld id="{7163770A-BA93-F747-A6F5-6B9E28E65E39}" type="slidenum">
+              <a:rPr lang="en-US" smtClean="0"/>
+              <a:t>2</a:t>
+            </a:fld>
+            <a:endParaRPr lang="en-US"/>
+          </a:p>
+        </p:txBody>
+      </p:sp>
+    </p:spTree>
+    <p:extLst>
+      <p:ext uri="{BB962C8B-B14F-4D97-AF65-F5344CB8AC3E}">
+        <p14:creationId xmlns:p14="http://schemas.microsoft.com/office/powerpoint/2010/main" val="4128291083"/>
+      </p:ext>
+    </p:extLst>
+  </p:cSld>
+  <p:clrMapOvr>
+    <a:masterClrMapping/>
+  </p:clrMapOvr>
+</p:notes>
+</file>
+
+<file path=ppt/notesSlides/notesSlide3.xml><?xml version="1.0" encoding="utf-8"?>
+<p:notes xmlns:a="http://schemas.openxmlformats.org/drawingml/2006/main" xmlns:r="http://schemas.openxmlformats.org/officeDocument/2006/relationships" xmlns:p="http://schemas.openxmlformats.org/presentationml/2006/main">
+  <p:cSld>
+    <p:spTree>
+      <p:nvGrpSpPr>
+        <p:cNvPr id="1" name=""/>
+        <p:cNvGrpSpPr/>
+        <p:nvPr/>
+      </p:nvGrpSpPr>
+      <p:grpSpPr>
+        <a:xfrm>
+          <a:off x="0" y="0"/>
+          <a:ext cx="0" cy="0"/>
+          <a:chOff x="0" y="0"/>
+          <a:chExt cx="0" cy="0"/>
+        </a:xfrm>
+      </p:grpSpPr>
+      <p:sp>
+        <p:nvSpPr>
+          <p:cNvPr id="2" name="Slide Image Placeholder 1"/>
+          <p:cNvSpPr>
+            <a:spLocks noGrp="1" noRot="1" noChangeAspect="1"/>
+          </p:cNvSpPr>
+          <p:nvPr>
+            <p:ph type="sldImg"/>
+          </p:nvPr>
+        </p:nvSpPr>
+        <p:spPr/>
+      </p:sp>
+      <p:sp>
+        <p:nvSpPr>
+          <p:cNvPr id="3" name="Notes Placeholder 2"/>
+          <p:cNvSpPr>
+            <a:spLocks noGrp="1"/>
+          </p:cNvSpPr>
+          <p:nvPr>
+            <p:ph type="body" idx="1"/>
+          </p:nvPr>
+        </p:nvSpPr>
+        <p:spPr/>
+        <p:txBody>
+          <a:bodyPr/>
+          <a:lstStyle/>
+          <a:p>
+            <a:r>
+              <a:rPr lang="en-US" dirty="0"/>
+              <a:t>The C-13 and N-15 isotopically enriched atoms used to substitute the natural carbon and nitrogen atoms are probably 99% pure. That means that they have about 1% C-12 and N-14, respectively. This creates kind of an inverse isotopic distribution for the C-series tags where the heavies tags contribute more to the "N-1" tags that the light tags do. This is seen in the top row.</a:t>
+            </a:r>
+          </a:p>
+          <a:p>
+            <a:endParaRPr lang="en-US" dirty="0"/>
+          </a:p>
+          <a:p>
+            <a:r>
+              <a:rPr lang="en-US" dirty="0"/>
+              <a:t>The situation for the N-series tags is more complicated. The have a mixture of C-13 atoms and one N-15 atom. Most of the "N-1" intensity crosstalk stays in the N-series (from the C-13 atoms). However, the delta-delta masses of the N- and C-series tags are 6 </a:t>
+            </a:r>
+            <a:r>
+              <a:rPr lang="en-US" dirty="0" err="1"/>
+              <a:t>milliDa</a:t>
+            </a:r>
+            <a:r>
+              <a:rPr lang="en-US" dirty="0"/>
+              <a:t> different. The N-15 atom </a:t>
+            </a:r>
+            <a:r>
+              <a:rPr lang="en-US" dirty="0" err="1"/>
+              <a:t>crosstalks</a:t>
+            </a:r>
+            <a:r>
+              <a:rPr lang="en-US" dirty="0"/>
+              <a:t> into the "N-1" C-series tag. There is a little scrambling between the N- and C-series, as shown in the bottom row.</a:t>
+            </a:r>
+          </a:p>
+        </p:txBody>
+      </p:sp>
+      <p:sp>
+        <p:nvSpPr>
+          <p:cNvPr id="4" name="Slide Number Placeholder 3"/>
+          <p:cNvSpPr>
+            <a:spLocks noGrp="1"/>
+          </p:cNvSpPr>
+          <p:nvPr>
+            <p:ph type="sldNum" sz="quarter" idx="5"/>
+          </p:nvPr>
+        </p:nvSpPr>
+        <p:spPr/>
+        <p:txBody>
+          <a:bodyPr/>
+          <a:lstStyle/>
+          <a:p>
+            <a:fld id="{7163770A-BA93-F747-A6F5-6B9E28E65E39}" type="slidenum">
+              <a:rPr lang="en-US" smtClean="0"/>
+              <a:t>3</a:t>
+            </a:fld>
+            <a:endParaRPr lang="en-US"/>
+          </a:p>
+        </p:txBody>
+      </p:sp>
+    </p:spTree>
+    <p:extLst>
+      <p:ext uri="{BB962C8B-B14F-4D97-AF65-F5344CB8AC3E}">
+        <p14:creationId xmlns:p14="http://schemas.microsoft.com/office/powerpoint/2010/main" val="3704938939"/>
+      </p:ext>
+    </p:extLst>
+  </p:cSld>
+  <p:clrMapOvr>
+    <a:masterClrMapping/>
+  </p:clrMapOvr>
+</p:notes>
+</file>
+
+<file path=ppt/notesSlides/notesSlide4.xml><?xml version="1.0" encoding="utf-8"?>
+<p:notes xmlns:a="http://schemas.openxmlformats.org/drawingml/2006/main" xmlns:r="http://schemas.openxmlformats.org/officeDocument/2006/relationships" xmlns:p="http://schemas.openxmlformats.org/presentationml/2006/main">
+  <p:cSld>
+    <p:spTree>
+      <p:nvGrpSpPr>
+        <p:cNvPr id="1" name=""/>
+        <p:cNvGrpSpPr/>
+        <p:nvPr/>
+      </p:nvGrpSpPr>
+      <p:grpSpPr>
+        <a:xfrm>
+          <a:off x="0" y="0"/>
+          <a:ext cx="0" cy="0"/>
+          <a:chOff x="0" y="0"/>
+          <a:chExt cx="0" cy="0"/>
+        </a:xfrm>
+      </p:grpSpPr>
+      <p:sp>
+        <p:nvSpPr>
+          <p:cNvPr id="2" name="Slide Image Placeholder 1"/>
+          <p:cNvSpPr>
+            <a:spLocks noGrp="1" noRot="1" noChangeAspect="1"/>
+          </p:cNvSpPr>
+          <p:nvPr>
+            <p:ph type="sldImg"/>
+          </p:nvPr>
+        </p:nvSpPr>
+        <p:spPr/>
+      </p:sp>
+      <p:sp>
+        <p:nvSpPr>
+          <p:cNvPr id="3" name="Notes Placeholder 2"/>
+          <p:cNvSpPr>
+            <a:spLocks noGrp="1"/>
+          </p:cNvSpPr>
+          <p:nvPr>
+            <p:ph type="body" idx="1"/>
+          </p:nvPr>
+        </p:nvSpPr>
+        <p:spPr/>
+        <p:txBody>
+          <a:bodyPr/>
+          <a:lstStyle/>
+          <a:p>
+            <a:r>
+              <a:rPr lang="en-US" dirty="0"/>
+              <a:t>The net effect of the "N+1" and "N-1" isotopic carryover is that each tag's peak is about 92% due to that channel and 8% that comes from adjacent channels, and this is (mostly) independent of tag. This carryover/crosstalk limits the dynamic range of TMT measurements. 5-fold changes are about as far as you can go before accuracy is affected. This is okay for most differential abundance measurements.</a:t>
+            </a:r>
+          </a:p>
+          <a:p>
+            <a:endParaRPr lang="en-US" dirty="0"/>
+          </a:p>
+          <a:p>
+            <a:r>
+              <a:rPr lang="en-US" dirty="0"/>
+              <a:t>If you need more dynamic range for accuracy at larger fold-changes, you can create tag series that basically have every other channel empty. You can't get crosstalk from something that is not there. There is a series with 10 tags (top row) and the complement series with 8 tags (bottom row).</a:t>
+            </a:r>
+          </a:p>
+        </p:txBody>
+      </p:sp>
+      <p:sp>
+        <p:nvSpPr>
+          <p:cNvPr id="4" name="Slide Number Placeholder 3"/>
+          <p:cNvSpPr>
+            <a:spLocks noGrp="1"/>
+          </p:cNvSpPr>
+          <p:nvPr>
+            <p:ph type="sldNum" sz="quarter" idx="5"/>
+          </p:nvPr>
+        </p:nvSpPr>
+        <p:spPr/>
+        <p:txBody>
+          <a:bodyPr/>
+          <a:lstStyle/>
+          <a:p>
+            <a:fld id="{7163770A-BA93-F747-A6F5-6B9E28E65E39}" type="slidenum">
+              <a:rPr lang="en-US" smtClean="0"/>
+              <a:t>4</a:t>
+            </a:fld>
+            <a:endParaRPr lang="en-US"/>
+          </a:p>
+        </p:txBody>
+      </p:sp>
+    </p:spTree>
+    <p:extLst>
+      <p:ext uri="{BB962C8B-B14F-4D97-AF65-F5344CB8AC3E}">
+        <p14:creationId xmlns:p14="http://schemas.microsoft.com/office/powerpoint/2010/main" val="2546391761"/>
+      </p:ext>
+    </p:extLst>
+  </p:cSld>
+  <p:clrMapOvr>
+    <a:masterClrMapping/>
+  </p:clrMapOvr>
+</p:notes>
+</file>
+
+<file path=ppt/notesSlides/notesSlide5.xml><?xml version="1.0" encoding="utf-8"?>
+<p:notes xmlns:a="http://schemas.openxmlformats.org/drawingml/2006/main" xmlns:r="http://schemas.openxmlformats.org/officeDocument/2006/relationships" xmlns:p="http://schemas.openxmlformats.org/presentationml/2006/main">
+  <p:cSld>
+    <p:spTree>
+      <p:nvGrpSpPr>
+        <p:cNvPr id="1" name=""/>
+        <p:cNvGrpSpPr/>
+        <p:nvPr/>
+      </p:nvGrpSpPr>
+      <p:grpSpPr>
+        <a:xfrm>
+          <a:off x="0" y="0"/>
+          <a:ext cx="0" cy="0"/>
+          <a:chOff x="0" y="0"/>
+          <a:chExt cx="0" cy="0"/>
+        </a:xfrm>
+      </p:grpSpPr>
+      <p:sp>
+        <p:nvSpPr>
+          <p:cNvPr id="2" name="Slide Image Placeholder 1"/>
+          <p:cNvSpPr>
+            <a:spLocks noGrp="1" noRot="1" noChangeAspect="1"/>
+          </p:cNvSpPr>
+          <p:nvPr>
+            <p:ph type="sldImg"/>
+          </p:nvPr>
+        </p:nvSpPr>
+        <p:spPr/>
+      </p:sp>
+      <p:sp>
+        <p:nvSpPr>
+          <p:cNvPr id="3" name="Notes Placeholder 2"/>
+          <p:cNvSpPr>
+            <a:spLocks noGrp="1"/>
+          </p:cNvSpPr>
+          <p:nvPr>
+            <p:ph type="body" idx="1"/>
+          </p:nvPr>
+        </p:nvSpPr>
+        <p:spPr/>
+        <p:txBody>
+          <a:bodyPr/>
+          <a:lstStyle/>
+          <a:p>
+            <a:r>
+              <a:rPr lang="en-US" dirty="0"/>
+              <a:t>We can compute how much of each tag's peak area comes from that actual tag. We see that all of the middle tags are similar and have more crosstalk issues that the tags at either end of the tag masses. There is nothing lighter than 126C and 127 that can add to their intensities, so the crosstalk is only from heavier tags. Conversely, there are no heavier tags than 134C and 135N and the crosstalk only comes from lighter tags.</a:t>
+            </a:r>
+          </a:p>
+        </p:txBody>
+      </p:sp>
+      <p:sp>
+        <p:nvSpPr>
+          <p:cNvPr id="4" name="Slide Number Placeholder 3"/>
+          <p:cNvSpPr>
+            <a:spLocks noGrp="1"/>
+          </p:cNvSpPr>
+          <p:nvPr>
+            <p:ph type="sldNum" sz="quarter" idx="5"/>
+          </p:nvPr>
+        </p:nvSpPr>
+        <p:spPr/>
+        <p:txBody>
+          <a:bodyPr/>
+          <a:lstStyle/>
+          <a:p>
+            <a:fld id="{7163770A-BA93-F747-A6F5-6B9E28E65E39}" type="slidenum">
+              <a:rPr lang="en-US" smtClean="0"/>
+              <a:t>5</a:t>
+            </a:fld>
+            <a:endParaRPr lang="en-US"/>
+          </a:p>
+        </p:txBody>
+      </p:sp>
+    </p:spTree>
+    <p:extLst>
+      <p:ext uri="{BB962C8B-B14F-4D97-AF65-F5344CB8AC3E}">
+        <p14:creationId xmlns:p14="http://schemas.microsoft.com/office/powerpoint/2010/main" val="2069074172"/>
+      </p:ext>
+    </p:extLst>
+  </p:cSld>
+  <p:clrMapOvr>
+    <a:masterClrMapping/>
+  </p:clrMapOvr>
+</p:notes>
+</file>
+
+<file path=ppt/notesSlides/notesSlide6.xml><?xml version="1.0" encoding="utf-8"?>
+<p:notes xmlns:a="http://schemas.openxmlformats.org/drawingml/2006/main" xmlns:r="http://schemas.openxmlformats.org/officeDocument/2006/relationships" xmlns:p="http://schemas.openxmlformats.org/presentationml/2006/main">
+  <p:cSld>
+    <p:spTree>
+      <p:nvGrpSpPr>
+        <p:cNvPr id="1" name=""/>
+        <p:cNvGrpSpPr/>
+        <p:nvPr/>
+      </p:nvGrpSpPr>
+      <p:grpSpPr>
+        <a:xfrm>
+          <a:off x="0" y="0"/>
+          <a:ext cx="0" cy="0"/>
+          <a:chOff x="0" y="0"/>
+          <a:chExt cx="0" cy="0"/>
+        </a:xfrm>
+      </p:grpSpPr>
+      <p:sp>
+        <p:nvSpPr>
+          <p:cNvPr id="2" name="Slide Image Placeholder 1"/>
+          <p:cNvSpPr>
+            <a:spLocks noGrp="1" noRot="1" noChangeAspect="1"/>
+          </p:cNvSpPr>
+          <p:nvPr>
+            <p:ph type="sldImg"/>
+          </p:nvPr>
+        </p:nvSpPr>
+        <p:spPr/>
+      </p:sp>
+      <p:sp>
+        <p:nvSpPr>
+          <p:cNvPr id="3" name="Notes Placeholder 2"/>
+          <p:cNvSpPr>
+            <a:spLocks noGrp="1"/>
+          </p:cNvSpPr>
+          <p:nvPr>
+            <p:ph type="body" idx="1"/>
+          </p:nvPr>
+        </p:nvSpPr>
+        <p:spPr/>
+        <p:txBody>
+          <a:bodyPr/>
+          <a:lstStyle/>
+          <a:p>
+            <a:r>
+              <a:rPr lang="en-US" dirty="0"/>
+              <a:t>If we mixed samples in amounts such that the monoisotopic peak of each tag was 100%, we would see these total intensities for each tag.</a:t>
+            </a:r>
+          </a:p>
+        </p:txBody>
+      </p:sp>
+      <p:sp>
+        <p:nvSpPr>
+          <p:cNvPr id="4" name="Slide Number Placeholder 3"/>
+          <p:cNvSpPr>
+            <a:spLocks noGrp="1"/>
+          </p:cNvSpPr>
+          <p:nvPr>
+            <p:ph type="sldNum" sz="quarter" idx="5"/>
+          </p:nvPr>
+        </p:nvSpPr>
+        <p:spPr/>
+        <p:txBody>
+          <a:bodyPr/>
+          <a:lstStyle/>
+          <a:p>
+            <a:fld id="{7163770A-BA93-F747-A6F5-6B9E28E65E39}" type="slidenum">
+              <a:rPr lang="en-US" smtClean="0"/>
+              <a:t>6</a:t>
+            </a:fld>
+            <a:endParaRPr lang="en-US"/>
+          </a:p>
+        </p:txBody>
+      </p:sp>
+    </p:spTree>
+    <p:extLst>
+      <p:ext uri="{BB962C8B-B14F-4D97-AF65-F5344CB8AC3E}">
+        <p14:creationId xmlns:p14="http://schemas.microsoft.com/office/powerpoint/2010/main" val="3923161926"/>
+      </p:ext>
+    </p:extLst>
+  </p:cSld>
+  <p:clrMapOvr>
+    <a:masterClrMapping/>
+  </p:clrMapOvr>
+</p:notes>
+</file>
+
+<file path=ppt/notesSlides/notesSlide7.xml><?xml version="1.0" encoding="utf-8"?>
+<p:notes xmlns:a="http://schemas.openxmlformats.org/drawingml/2006/main" xmlns:r="http://schemas.openxmlformats.org/officeDocument/2006/relationships" xmlns:p="http://schemas.openxmlformats.org/presentationml/2006/main">
+  <p:cSld>
+    <p:spTree>
+      <p:nvGrpSpPr>
+        <p:cNvPr id="1" name=""/>
+        <p:cNvGrpSpPr/>
+        <p:nvPr/>
+      </p:nvGrpSpPr>
+      <p:grpSpPr>
+        <a:xfrm>
+          <a:off x="0" y="0"/>
+          <a:ext cx="0" cy="0"/>
+          <a:chOff x="0" y="0"/>
+          <a:chExt cx="0" cy="0"/>
+        </a:xfrm>
+      </p:grpSpPr>
+      <p:sp>
+        <p:nvSpPr>
+          <p:cNvPr id="2" name="Slide Image Placeholder 1"/>
+          <p:cNvSpPr>
+            <a:spLocks noGrp="1" noRot="1" noChangeAspect="1"/>
+          </p:cNvSpPr>
+          <p:nvPr>
+            <p:ph type="sldImg"/>
+          </p:nvPr>
+        </p:nvSpPr>
+        <p:spPr/>
+      </p:sp>
+      <p:sp>
+        <p:nvSpPr>
+          <p:cNvPr id="3" name="Notes Placeholder 2"/>
+          <p:cNvSpPr>
+            <a:spLocks noGrp="1"/>
+          </p:cNvSpPr>
+          <p:nvPr>
+            <p:ph type="body" idx="1"/>
+          </p:nvPr>
+        </p:nvSpPr>
+        <p:spPr/>
+        <p:txBody>
+          <a:bodyPr/>
+          <a:lstStyle/>
+          <a:p>
+            <a:r>
+              <a:rPr lang="en-US" dirty="0"/>
+              <a:t>We can combine the purity and total relative intensity information into this stacked bar plot where each tag has a different color. We see that the purity of the two lightest tags and the two heaviest tags are higher that the middle tags. Because less crosstalk contributes to the total intensity for the two lightest and two heaviest tags, they have reduced relative intensity totals.</a:t>
+            </a:r>
+          </a:p>
+          <a:p>
+            <a:endParaRPr lang="en-US" dirty="0"/>
+          </a:p>
+          <a:p>
+            <a:r>
+              <a:rPr lang="en-US" dirty="0"/>
+              <a:t>I do not try to deconvolute tag intensities based on the measured tag isotopic distributions (the numbers in the spec sheets). That is more complicated than early algorithms were designed to handle because of the N-series tags. I just assume (and live with) the fact that large fold changes may be less accurate. </a:t>
+            </a:r>
+            <a:r>
+              <a:rPr lang="en-US"/>
+              <a:t>It is safer to understand measurement limits (provided they are still usable) than to make corrections that may be error prone (noisy values, missing values). </a:t>
+            </a:r>
+          </a:p>
+        </p:txBody>
+      </p:sp>
+      <p:sp>
+        <p:nvSpPr>
+          <p:cNvPr id="4" name="Slide Number Placeholder 3"/>
+          <p:cNvSpPr>
+            <a:spLocks noGrp="1"/>
+          </p:cNvSpPr>
+          <p:nvPr>
+            <p:ph type="sldNum" sz="quarter" idx="5"/>
+          </p:nvPr>
+        </p:nvSpPr>
+        <p:spPr/>
+        <p:txBody>
+          <a:bodyPr/>
+          <a:lstStyle/>
+          <a:p>
+            <a:fld id="{7163770A-BA93-F747-A6F5-6B9E28E65E39}" type="slidenum">
+              <a:rPr lang="en-US" smtClean="0"/>
+              <a:t>7</a:t>
+            </a:fld>
+            <a:endParaRPr lang="en-US"/>
+          </a:p>
+        </p:txBody>
+      </p:sp>
+    </p:spTree>
+    <p:extLst>
+      <p:ext uri="{BB962C8B-B14F-4D97-AF65-F5344CB8AC3E}">
+        <p14:creationId xmlns:p14="http://schemas.microsoft.com/office/powerpoint/2010/main" val="688814562"/>
+      </p:ext>
+    </p:extLst>
+  </p:cSld>
+  <p:clrMapOvr>
+    <a:masterClrMapping/>
+  </p:clrMapOvr>
+</p:notes>
+</file>
+
 <file path=ppt/slideLayouts/slideLayout1.xml><?xml version="1.0" encoding="utf-8"?>
 <p:sldLayout xmlns:a="http://schemas.openxmlformats.org/drawingml/2006/main" xmlns:r="http://schemas.openxmlformats.org/officeDocument/2006/relationships" xmlns:p="http://schemas.openxmlformats.org/presentationml/2006/main" type="title" preserve="1">
   <p:cSld name="Title Slide">
@@ -265,7 +1291,7 @@
           <a:p>
             <a:fld id="{AAC98710-FAC5-4946-ADAF-482467A9B789}" type="datetimeFigureOut">
               <a:rPr lang="en-US" smtClean="0"/>
-              <a:t>8/22/22</a:t>
+              <a:t>12/1/22</a:t>
             </a:fld>
             <a:endParaRPr lang="en-US"/>
           </a:p>
@@ -463,7 +1489,7 @@
           <a:p>
             <a:fld id="{AAC98710-FAC5-4946-ADAF-482467A9B789}" type="datetimeFigureOut">
               <a:rPr lang="en-US" smtClean="0"/>
-              <a:t>8/22/22</a:t>
+              <a:t>12/1/22</a:t>
             </a:fld>
             <a:endParaRPr lang="en-US"/>
           </a:p>
@@ -671,7 +1697,7 @@
           <a:p>
             <a:fld id="{AAC98710-FAC5-4946-ADAF-482467A9B789}" type="datetimeFigureOut">
               <a:rPr lang="en-US" smtClean="0"/>
-              <a:t>8/22/22</a:t>
+              <a:t>12/1/22</a:t>
             </a:fld>
             <a:endParaRPr lang="en-US"/>
           </a:p>
@@ -869,7 +1895,7 @@
           <a:p>
             <a:fld id="{AAC98710-FAC5-4946-ADAF-482467A9B789}" type="datetimeFigureOut">
               <a:rPr lang="en-US" smtClean="0"/>
-              <a:t>8/22/22</a:t>
+              <a:t>12/1/22</a:t>
             </a:fld>
             <a:endParaRPr lang="en-US"/>
           </a:p>
@@ -1144,7 +2170,7 @@
           <a:p>
             <a:fld id="{AAC98710-FAC5-4946-ADAF-482467A9B789}" type="datetimeFigureOut">
               <a:rPr lang="en-US" smtClean="0"/>
-              <a:t>8/22/22</a:t>
+              <a:t>12/1/22</a:t>
             </a:fld>
             <a:endParaRPr lang="en-US"/>
           </a:p>
@@ -1409,7 +2435,7 @@
           <a:p>
             <a:fld id="{AAC98710-FAC5-4946-ADAF-482467A9B789}" type="datetimeFigureOut">
               <a:rPr lang="en-US" smtClean="0"/>
-              <a:t>8/22/22</a:t>
+              <a:t>12/1/22</a:t>
             </a:fld>
             <a:endParaRPr lang="en-US"/>
           </a:p>
@@ -1821,7 +2847,7 @@
           <a:p>
             <a:fld id="{AAC98710-FAC5-4946-ADAF-482467A9B789}" type="datetimeFigureOut">
               <a:rPr lang="en-US" smtClean="0"/>
-              <a:t>8/22/22</a:t>
+              <a:t>12/1/22</a:t>
             </a:fld>
             <a:endParaRPr lang="en-US"/>
           </a:p>
@@ -1962,7 +2988,7 @@
           <a:p>
             <a:fld id="{AAC98710-FAC5-4946-ADAF-482467A9B789}" type="datetimeFigureOut">
               <a:rPr lang="en-US" smtClean="0"/>
-              <a:t>8/22/22</a:t>
+              <a:t>12/1/22</a:t>
             </a:fld>
             <a:endParaRPr lang="en-US"/>
           </a:p>
@@ -2075,7 +3101,7 @@
           <a:p>
             <a:fld id="{AAC98710-FAC5-4946-ADAF-482467A9B789}" type="datetimeFigureOut">
               <a:rPr lang="en-US" smtClean="0"/>
-              <a:t>8/22/22</a:t>
+              <a:t>12/1/22</a:t>
             </a:fld>
             <a:endParaRPr lang="en-US"/>
           </a:p>
@@ -2386,7 +3412,7 @@
           <a:p>
             <a:fld id="{AAC98710-FAC5-4946-ADAF-482467A9B789}" type="datetimeFigureOut">
               <a:rPr lang="en-US" smtClean="0"/>
-              <a:t>8/22/22</a:t>
+              <a:t>12/1/22</a:t>
             </a:fld>
             <a:endParaRPr lang="en-US"/>
           </a:p>
@@ -2674,7 +3700,7 @@
           <a:p>
             <a:fld id="{AAC98710-FAC5-4946-ADAF-482467A9B789}" type="datetimeFigureOut">
               <a:rPr lang="en-US" smtClean="0"/>
-              <a:t>8/22/22</a:t>
+              <a:t>12/1/22</a:t>
             </a:fld>
             <a:endParaRPr lang="en-US"/>
           </a:p>
@@ -2915,7 +3941,7 @@
           <a:p>
             <a:fld id="{AAC98710-FAC5-4946-ADAF-482467A9B789}" type="datetimeFigureOut">
               <a:rPr lang="en-US" smtClean="0"/>
-              <a:t>8/22/22</a:t>
+              <a:t>12/1/22</a:t>
             </a:fld>
             <a:endParaRPr lang="en-US"/>
           </a:p>
@@ -22699,7 +23725,7 @@
           <p:nvPr/>
         </p:nvPicPr>
         <p:blipFill>
-          <a:blip r:embed="rId2"/>
+          <a:blip r:embed="rId3"/>
           <a:stretch>
             <a:fillRect/>
           </a:stretch>
@@ -22784,7 +23810,7 @@
           <p:nvPr/>
         </p:nvPicPr>
         <p:blipFill>
-          <a:blip r:embed="rId2"/>
+          <a:blip r:embed="rId3"/>
           <a:stretch>
             <a:fillRect/>
           </a:stretch>
@@ -22839,10 +23865,10 @@
       </p:grpSpPr>
       <p:pic>
         <p:nvPicPr>
-          <p:cNvPr id="3" name="Picture 2" descr="Chart, bar chart&#10;&#10;Description automatically generated">
-            <a:extLst>
-              <a:ext uri="{FF2B5EF4-FFF2-40B4-BE49-F238E27FC236}">
-                <a16:creationId xmlns:a16="http://schemas.microsoft.com/office/drawing/2014/main" id="{10BEE48B-935F-2146-D356-6DC6CCC1C916}"/>
+          <p:cNvPr id="2" name="Picture 1">
+            <a:extLst>
+              <a:ext uri="{FF2B5EF4-FFF2-40B4-BE49-F238E27FC236}">
+                <a16:creationId xmlns:a16="http://schemas.microsoft.com/office/drawing/2014/main" id="{3CA66BDC-BF9C-7CAB-6800-3FC0440870C0}"/>
               </a:ext>
             </a:extLst>
           </p:cNvPr>
@@ -22852,15 +23878,15 @@
           <p:nvPr/>
         </p:nvPicPr>
         <p:blipFill>
-          <a:blip r:embed="rId2"/>
+          <a:blip r:embed="rId3"/>
           <a:stretch>
             <a:fillRect/>
           </a:stretch>
         </p:blipFill>
         <p:spPr>
           <a:xfrm>
-            <a:off x="643467" y="743628"/>
-            <a:ext cx="10905066" cy="5370742"/>
+            <a:off x="604117" y="725204"/>
+            <a:ext cx="10983765" cy="5407591"/>
           </a:xfrm>
           <a:prstGeom prst="rect">
             <a:avLst/>
@@ -23173,4 +24199,299 @@
     </a:ext>
   </a:extLst>
 </a:theme>
+</file>
+
+<file path=ppt/theme/theme2.xml><?xml version="1.0" encoding="utf-8"?>
+<a:theme xmlns:a="http://schemas.openxmlformats.org/drawingml/2006/main" name="Office Theme">
+  <a:themeElements>
+    <a:clrScheme name="Office">
+      <a:dk1>
+        <a:sysClr val="windowText" lastClr="000000"/>
+      </a:dk1>
+      <a:lt1>
+        <a:sysClr val="window" lastClr="FFFFFF"/>
+      </a:lt1>
+      <a:dk2>
+        <a:srgbClr val="44546A"/>
+      </a:dk2>
+      <a:lt2>
+        <a:srgbClr val="E7E6E6"/>
+      </a:lt2>
+      <a:accent1>
+        <a:srgbClr val="4472C4"/>
+      </a:accent1>
+      <a:accent2>
+        <a:srgbClr val="ED7D31"/>
+      </a:accent2>
+      <a:accent3>
+        <a:srgbClr val="A5A5A5"/>
+      </a:accent3>
+      <a:accent4>
+        <a:srgbClr val="FFC000"/>
+      </a:accent4>
+      <a:accent5>
+        <a:srgbClr val="5B9BD5"/>
+      </a:accent5>
+      <a:accent6>
+        <a:srgbClr val="70AD47"/>
+      </a:accent6>
+      <a:hlink>
+        <a:srgbClr val="0563C1"/>
+      </a:hlink>
+      <a:folHlink>
+        <a:srgbClr val="954F72"/>
+      </a:folHlink>
+    </a:clrScheme>
+    <a:fontScheme name="Office">
+      <a:majorFont>
+        <a:latin typeface="Calibri Light" panose="020F0302020204030204"/>
+        <a:ea typeface=""/>
+        <a:cs typeface=""/>
+        <a:font script="Jpan" typeface="游ゴシック Light"/>
+        <a:font script="Hang" typeface="맑은 고딕"/>
+        <a:font script="Hans" typeface="等线 Light"/>
+        <a:font script="Hant" typeface="新細明體"/>
+        <a:font script="Arab" typeface="Times New Roman"/>
+        <a:font script="Hebr" typeface="Times New Roman"/>
+        <a:font script="Thai" typeface="Angsana New"/>
+        <a:font script="Ethi" typeface="Nyala"/>
+        <a:font script="Beng" typeface="Vrinda"/>
+        <a:font script="Gujr" typeface="Shruti"/>
+        <a:font script="Khmr" typeface="MoolBoran"/>
+        <a:font script="Knda" typeface="Tunga"/>
+        <a:font script="Guru" typeface="Raavi"/>
+        <a:font script="Cans" typeface="Euphemia"/>
+        <a:font script="Cher" typeface="Plantagenet Cherokee"/>
+        <a:font script="Yiii" typeface="Microsoft Yi Baiti"/>
+        <a:font script="Tibt" typeface="Microsoft Himalaya"/>
+        <a:font script="Thaa" typeface="MV Boli"/>
+        <a:font script="Deva" typeface="Mangal"/>
+        <a:font script="Telu" typeface="Gautami"/>
+        <a:font script="Taml" typeface="Latha"/>
+        <a:font script="Syrc" typeface="Estrangelo Edessa"/>
+        <a:font script="Orya" typeface="Kalinga"/>
+        <a:font script="Mlym" typeface="Kartika"/>
+        <a:font script="Laoo" typeface="DokChampa"/>
+        <a:font script="Sinh" typeface="Iskoola Pota"/>
+        <a:font script="Mong" typeface="Mongolian Baiti"/>
+        <a:font script="Viet" typeface="Times New Roman"/>
+        <a:font script="Uigh" typeface="Microsoft Uighur"/>
+        <a:font script="Geor" typeface="Sylfaen"/>
+        <a:font script="Armn" typeface="Arial"/>
+        <a:font script="Bugi" typeface="Leelawadee UI"/>
+        <a:font script="Bopo" typeface="Microsoft JhengHei"/>
+        <a:font script="Java" typeface="Javanese Text"/>
+        <a:font script="Lisu" typeface="Segoe UI"/>
+        <a:font script="Mymr" typeface="Myanmar Text"/>
+        <a:font script="Nkoo" typeface="Ebrima"/>
+        <a:font script="Olck" typeface="Nirmala UI"/>
+        <a:font script="Osma" typeface="Ebrima"/>
+        <a:font script="Phag" typeface="Phagspa"/>
+        <a:font script="Syrn" typeface="Estrangelo Edessa"/>
+        <a:font script="Syrj" typeface="Estrangelo Edessa"/>
+        <a:font script="Syre" typeface="Estrangelo Edessa"/>
+        <a:font script="Sora" typeface="Nirmala UI"/>
+        <a:font script="Tale" typeface="Microsoft Tai Le"/>
+        <a:font script="Talu" typeface="Microsoft New Tai Lue"/>
+        <a:font script="Tfng" typeface="Ebrima"/>
+      </a:majorFont>
+      <a:minorFont>
+        <a:latin typeface="Calibri" panose="020F0502020204030204"/>
+        <a:ea typeface=""/>
+        <a:cs typeface=""/>
+        <a:font script="Jpan" typeface="游ゴシック"/>
+        <a:font script="Hang" typeface="맑은 고딕"/>
+        <a:font script="Hans" typeface="等线"/>
+        <a:font script="Hant" typeface="新細明體"/>
+        <a:font script="Arab" typeface="Arial"/>
+        <a:font script="Hebr" typeface="Arial"/>
+        <a:font script="Thai" typeface="Cordia New"/>
+        <a:font script="Ethi" typeface="Nyala"/>
+        <a:font script="Beng" typeface="Vrinda"/>
+        <a:font script="Gujr" typeface="Shruti"/>
+        <a:font script="Khmr" typeface="DaunPenh"/>
+        <a:font script="Knda" typeface="Tunga"/>
+        <a:font script="Guru" typeface="Raavi"/>
+        <a:font script="Cans" typeface="Euphemia"/>
+        <a:font script="Cher" typeface="Plantagenet Cherokee"/>
+        <a:font script="Yiii" typeface="Microsoft Yi Baiti"/>
+        <a:font script="Tibt" typeface="Microsoft Himalaya"/>
+        <a:font script="Thaa" typeface="MV Boli"/>
+        <a:font script="Deva" typeface="Mangal"/>
+        <a:font script="Telu" typeface="Gautami"/>
+        <a:font script="Taml" typeface="Latha"/>
+        <a:font script="Syrc" typeface="Estrangelo Edessa"/>
+        <a:font script="Orya" typeface="Kalinga"/>
+        <a:font script="Mlym" typeface="Kartika"/>
+        <a:font script="Laoo" typeface="DokChampa"/>
+        <a:font script="Sinh" typeface="Iskoola Pota"/>
+        <a:font script="Mong" typeface="Mongolian Baiti"/>
+        <a:font script="Viet" typeface="Arial"/>
+        <a:font script="Uigh" typeface="Microsoft Uighur"/>
+        <a:font script="Geor" typeface="Sylfaen"/>
+        <a:font script="Armn" typeface="Arial"/>
+        <a:font script="Bugi" typeface="Leelawadee UI"/>
+        <a:font script="Bopo" typeface="Microsoft JhengHei"/>
+        <a:font script="Java" typeface="Javanese Text"/>
+        <a:font script="Lisu" typeface="Segoe UI"/>
+        <a:font script="Mymr" typeface="Myanmar Text"/>
+        <a:font script="Nkoo" typeface="Ebrima"/>
+        <a:font script="Olck" typeface="Nirmala UI"/>
+        <a:font script="Osma" typeface="Ebrima"/>
+        <a:font script="Phag" typeface="Phagspa"/>
+        <a:font script="Syrn" typeface="Estrangelo Edessa"/>
+        <a:font script="Syrj" typeface="Estrangelo Edessa"/>
+        <a:font script="Syre" typeface="Estrangelo Edessa"/>
+        <a:font script="Sora" typeface="Nirmala UI"/>
+        <a:font script="Tale" typeface="Microsoft Tai Le"/>
+        <a:font script="Talu" typeface="Microsoft New Tai Lue"/>
+        <a:font script="Tfng" typeface="Ebrima"/>
+      </a:minorFont>
+    </a:fontScheme>
+    <a:fmtScheme name="Office">
+      <a:fillStyleLst>
+        <a:solidFill>
+          <a:schemeClr val="phClr"/>
+        </a:solidFill>
+        <a:gradFill rotWithShape="1">
+          <a:gsLst>
+            <a:gs pos="0">
+              <a:schemeClr val="phClr">
+                <a:lumMod val="110000"/>
+                <a:satMod val="105000"/>
+                <a:tint val="67000"/>
+              </a:schemeClr>
+            </a:gs>
+            <a:gs pos="50000">
+              <a:schemeClr val="phClr">
+                <a:lumMod val="105000"/>
+                <a:satMod val="103000"/>
+                <a:tint val="73000"/>
+              </a:schemeClr>
+            </a:gs>
+            <a:gs pos="100000">
+              <a:schemeClr val="phClr">
+                <a:lumMod val="105000"/>
+                <a:satMod val="109000"/>
+                <a:tint val="81000"/>
+              </a:schemeClr>
+            </a:gs>
+          </a:gsLst>
+          <a:lin ang="5400000" scaled="0"/>
+        </a:gradFill>
+        <a:gradFill rotWithShape="1">
+          <a:gsLst>
+            <a:gs pos="0">
+              <a:schemeClr val="phClr">
+                <a:satMod val="103000"/>
+                <a:lumMod val="102000"/>
+                <a:tint val="94000"/>
+              </a:schemeClr>
+            </a:gs>
+            <a:gs pos="50000">
+              <a:schemeClr val="phClr">
+                <a:satMod val="110000"/>
+                <a:lumMod val="100000"/>
+                <a:shade val="100000"/>
+              </a:schemeClr>
+            </a:gs>
+            <a:gs pos="100000">
+              <a:schemeClr val="phClr">
+                <a:lumMod val="99000"/>
+                <a:satMod val="120000"/>
+                <a:shade val="78000"/>
+              </a:schemeClr>
+            </a:gs>
+          </a:gsLst>
+          <a:lin ang="5400000" scaled="0"/>
+        </a:gradFill>
+      </a:fillStyleLst>
+      <a:lnStyleLst>
+        <a:ln w="6350" cap="flat" cmpd="sng" algn="ctr">
+          <a:solidFill>
+            <a:schemeClr val="phClr"/>
+          </a:solidFill>
+          <a:prstDash val="solid"/>
+          <a:miter lim="800000"/>
+        </a:ln>
+        <a:ln w="12700" cap="flat" cmpd="sng" algn="ctr">
+          <a:solidFill>
+            <a:schemeClr val="phClr"/>
+          </a:solidFill>
+          <a:prstDash val="solid"/>
+          <a:miter lim="800000"/>
+        </a:ln>
+        <a:ln w="19050" cap="flat" cmpd="sng" algn="ctr">
+          <a:solidFill>
+            <a:schemeClr val="phClr"/>
+          </a:solidFill>
+          <a:prstDash val="solid"/>
+          <a:miter lim="800000"/>
+        </a:ln>
+      </a:lnStyleLst>
+      <a:effectStyleLst>
+        <a:effectStyle>
+          <a:effectLst/>
+        </a:effectStyle>
+        <a:effectStyle>
+          <a:effectLst/>
+        </a:effectStyle>
+        <a:effectStyle>
+          <a:effectLst>
+            <a:outerShdw blurRad="57150" dist="19050" dir="5400000" algn="ctr" rotWithShape="0">
+              <a:srgbClr val="000000">
+                <a:alpha val="63000"/>
+              </a:srgbClr>
+            </a:outerShdw>
+          </a:effectLst>
+        </a:effectStyle>
+      </a:effectStyleLst>
+      <a:bgFillStyleLst>
+        <a:solidFill>
+          <a:schemeClr val="phClr"/>
+        </a:solidFill>
+        <a:solidFill>
+          <a:schemeClr val="phClr">
+            <a:tint val="95000"/>
+            <a:satMod val="170000"/>
+          </a:schemeClr>
+        </a:solidFill>
+        <a:gradFill rotWithShape="1">
+          <a:gsLst>
+            <a:gs pos="0">
+              <a:schemeClr val="phClr">
+                <a:tint val="93000"/>
+                <a:satMod val="150000"/>
+                <a:shade val="98000"/>
+                <a:lumMod val="102000"/>
+              </a:schemeClr>
+            </a:gs>
+            <a:gs pos="50000">
+              <a:schemeClr val="phClr">
+                <a:tint val="98000"/>
+                <a:satMod val="130000"/>
+                <a:shade val="90000"/>
+                <a:lumMod val="103000"/>
+              </a:schemeClr>
+            </a:gs>
+            <a:gs pos="100000">
+              <a:schemeClr val="phClr">
+                <a:shade val="63000"/>
+                <a:satMod val="120000"/>
+              </a:schemeClr>
+            </a:gs>
+          </a:gsLst>
+          <a:lin ang="5400000" scaled="0"/>
+        </a:gradFill>
+      </a:bgFillStyleLst>
+    </a:fmtScheme>
+  </a:themeElements>
+  <a:objectDefaults/>
+  <a:extraClrSchemeLst/>
+  <a:extLst>
+    <a:ext uri="{05A4C25C-085E-4340-85A3-A5531E510DB2}">
+      <thm15:themeFamily xmlns:thm15="http://schemas.microsoft.com/office/thememl/2012/main" name="Office Theme" id="{62F939B6-93AF-4DB8-9C6B-D6C7DFDC589F}" vid="{4A3C46E8-61CC-4603-A589-7422A47A8E4A}"/>
+    </a:ext>
+  </a:extLst>
+</a:theme>
 </file>
</xml_diff>

<commit_message>
edits to title slide
</commit_message>
<xml_diff>
--- a/Channel_crosstalk.pptx
+++ b/Channel_crosstalk.pptx
@@ -4381,7 +4381,7 @@
           <a:p>
             <a:r>
               <a:rPr lang="en-US" dirty="0"/>
-              <a:t>TMT channel cross-talk</a:t>
+              <a:t>TMT channel crosstalk</a:t>
             </a:r>
           </a:p>
         </p:txBody>
@@ -4415,7 +4415,7 @@
           <a:p>
             <a:r>
               <a:rPr lang="en-US" dirty="0"/>
-              <a:t>August 20, 2022</a:t>
+              <a:t>December 1, 2022</a:t>
             </a:r>
           </a:p>
         </p:txBody>

</xml_diff>